<commit_message>
Edits to DEBkiss update slides
</commit_message>
<xml_diff>
--- a/DEBkiss results/Current version and updates.pptx
+++ b/DEBkiss results/Current version and updates.pptx
@@ -5,7 +5,7 @@
     <p:sldMasterId id="2147483648" r:id="rId1"/>
   </p:sldMasterIdLst>
   <p:notesMasterIdLst>
-    <p:notesMasterId r:id="rId19"/>
+    <p:notesMasterId r:id="rId21"/>
   </p:notesMasterIdLst>
   <p:sldIdLst>
     <p:sldId id="271" r:id="rId2"/>
@@ -25,6 +25,8 @@
     <p:sldId id="257" r:id="rId16"/>
     <p:sldId id="265" r:id="rId17"/>
     <p:sldId id="266" r:id="rId18"/>
+    <p:sldId id="279" r:id="rId19"/>
+    <p:sldId id="280" r:id="rId20"/>
   </p:sldIdLst>
   <p:sldSz cx="12192000" cy="6858000"/>
   <p:notesSz cx="6858000" cy="9144000"/>
@@ -4951,7 +4953,7 @@
           <a:p>
             <a:fld id="{4D921083-DB13-42A6-992B-CAABFD17EE1B}" type="datetimeFigureOut">
               <a:rPr lang="en-US" smtClean="0"/>
-              <a:t>2/3/2023</a:t>
+              <a:t>2/6/2023</a:t>
             </a:fld>
             <a:endParaRPr lang="en-US"/>
           </a:p>
@@ -5522,6 +5524,9 @@
               </a:rPr>
               <a:t> gave a similar AIC (196.15) and similar quality of fit to data. </a:t>
             </a:r>
+          </a:p>
+          <a:p>
+            <a:pPr algn="l"/>
             <a:endParaRPr lang="en-US" dirty="0"/>
           </a:p>
         </p:txBody>
@@ -5793,7 +5798,7 @@
           <a:p>
             <a:fld id="{6B92F1DE-9F79-48FD-92D0-4E114789D296}" type="datetimeFigureOut">
               <a:rPr lang="en-US" smtClean="0"/>
-              <a:t>2/3/2023</a:t>
+              <a:t>2/6/2023</a:t>
             </a:fld>
             <a:endParaRPr lang="en-US"/>
           </a:p>
@@ -5991,7 +5996,7 @@
           <a:p>
             <a:fld id="{6B92F1DE-9F79-48FD-92D0-4E114789D296}" type="datetimeFigureOut">
               <a:rPr lang="en-US" smtClean="0"/>
-              <a:t>2/3/2023</a:t>
+              <a:t>2/6/2023</a:t>
             </a:fld>
             <a:endParaRPr lang="en-US"/>
           </a:p>
@@ -6199,7 +6204,7 @@
           <a:p>
             <a:fld id="{6B92F1DE-9F79-48FD-92D0-4E114789D296}" type="datetimeFigureOut">
               <a:rPr lang="en-US" smtClean="0"/>
-              <a:t>2/3/2023</a:t>
+              <a:t>2/6/2023</a:t>
             </a:fld>
             <a:endParaRPr lang="en-US"/>
           </a:p>
@@ -6397,7 +6402,7 @@
           <a:p>
             <a:fld id="{6B92F1DE-9F79-48FD-92D0-4E114789D296}" type="datetimeFigureOut">
               <a:rPr lang="en-US" smtClean="0"/>
-              <a:t>2/3/2023</a:t>
+              <a:t>2/6/2023</a:t>
             </a:fld>
             <a:endParaRPr lang="en-US"/>
           </a:p>
@@ -6672,7 +6677,7 @@
           <a:p>
             <a:fld id="{6B92F1DE-9F79-48FD-92D0-4E114789D296}" type="datetimeFigureOut">
               <a:rPr lang="en-US" smtClean="0"/>
-              <a:t>2/3/2023</a:t>
+              <a:t>2/6/2023</a:t>
             </a:fld>
             <a:endParaRPr lang="en-US"/>
           </a:p>
@@ -6937,7 +6942,7 @@
           <a:p>
             <a:fld id="{6B92F1DE-9F79-48FD-92D0-4E114789D296}" type="datetimeFigureOut">
               <a:rPr lang="en-US" smtClean="0"/>
-              <a:t>2/3/2023</a:t>
+              <a:t>2/6/2023</a:t>
             </a:fld>
             <a:endParaRPr lang="en-US"/>
           </a:p>
@@ -7349,7 +7354,7 @@
           <a:p>
             <a:fld id="{6B92F1DE-9F79-48FD-92D0-4E114789D296}" type="datetimeFigureOut">
               <a:rPr lang="en-US" smtClean="0"/>
-              <a:t>2/3/2023</a:t>
+              <a:t>2/6/2023</a:t>
             </a:fld>
             <a:endParaRPr lang="en-US"/>
           </a:p>
@@ -7490,7 +7495,7 @@
           <a:p>
             <a:fld id="{6B92F1DE-9F79-48FD-92D0-4E114789D296}" type="datetimeFigureOut">
               <a:rPr lang="en-US" smtClean="0"/>
-              <a:t>2/3/2023</a:t>
+              <a:t>2/6/2023</a:t>
             </a:fld>
             <a:endParaRPr lang="en-US"/>
           </a:p>
@@ -7603,7 +7608,7 @@
           <a:p>
             <a:fld id="{6B92F1DE-9F79-48FD-92D0-4E114789D296}" type="datetimeFigureOut">
               <a:rPr lang="en-US" smtClean="0"/>
-              <a:t>2/3/2023</a:t>
+              <a:t>2/6/2023</a:t>
             </a:fld>
             <a:endParaRPr lang="en-US"/>
           </a:p>
@@ -7914,7 +7919,7 @@
           <a:p>
             <a:fld id="{6B92F1DE-9F79-48FD-92D0-4E114789D296}" type="datetimeFigureOut">
               <a:rPr lang="en-US" smtClean="0"/>
-              <a:t>2/3/2023</a:t>
+              <a:t>2/6/2023</a:t>
             </a:fld>
             <a:endParaRPr lang="en-US"/>
           </a:p>
@@ -8202,7 +8207,7 @@
           <a:p>
             <a:fld id="{6B92F1DE-9F79-48FD-92D0-4E114789D296}" type="datetimeFigureOut">
               <a:rPr lang="en-US" smtClean="0"/>
-              <a:t>2/3/2023</a:t>
+              <a:t>2/6/2023</a:t>
             </a:fld>
             <a:endParaRPr lang="en-US"/>
           </a:p>
@@ -8443,7 +8448,7 @@
           <a:p>
             <a:fld id="{6B92F1DE-9F79-48FD-92D0-4E114789D296}" type="datetimeFigureOut">
               <a:rPr lang="en-US" smtClean="0"/>
-              <a:t>2/3/2023</a:t>
+              <a:t>2/6/2023</a:t>
             </a:fld>
             <a:endParaRPr lang="en-US"/>
           </a:p>
@@ -11424,14 +11429,14 @@
             <p:ph idx="1"/>
             <p:extLst>
               <p:ext uri="{D42A27DB-BD31-4B8C-83A1-F6EECF244321}">
-                <p14:modId xmlns:p14="http://schemas.microsoft.com/office/powerpoint/2010/main" val="812196134"/>
+                <p14:modId xmlns:p14="http://schemas.microsoft.com/office/powerpoint/2010/main" val="1890331268"/>
               </p:ext>
             </p:extLst>
           </p:nvPr>
         </p:nvGraphicFramePr>
         <p:xfrm>
           <a:off x="1213658" y="975360"/>
-          <a:ext cx="9016859" cy="5120640"/>
+          <a:ext cx="9016859" cy="5118359"/>
         </p:xfrm>
         <a:graphic>
           <a:graphicData uri="http://schemas.openxmlformats.org/drawingml/2006/table">
@@ -11556,12 +11561,12 @@
                         </a:spcAft>
                       </a:pPr>
                       <a:r>
-                        <a:rPr lang="en-US" sz="1600">
-                          <a:effectLst/>
-                        </a:rPr>
-                        <a:t>Parameters estimated from ODE</a:t>
-                      </a:r>
-                      <a:endParaRPr lang="en-US" sz="1600">
+                        <a:rPr lang="en-US" sz="1600" dirty="0">
+                          <a:effectLst/>
+                        </a:rPr>
+                        <a:t>Parameter estimates</a:t>
+                      </a:r>
+                      <a:endParaRPr lang="en-US" sz="1600" dirty="0">
                         <a:effectLst/>
                         <a:latin typeface="Calibri" panose="020F0502020204030204" pitchFamily="34" charset="0"/>
                         <a:ea typeface="Calibri" panose="020F0502020204030204" pitchFamily="34" charset="0"/>
@@ -15513,12 +15518,12 @@
                         </a:spcAft>
                       </a:pPr>
                       <a:r>
-                        <a:rPr lang="en-US" sz="1600">
+                        <a:rPr lang="en-US" sz="1600" dirty="0">
                           <a:effectLst/>
                         </a:rPr>
                         <a:t> </a:t>
                       </a:r>
-                      <a:endParaRPr lang="en-US" sz="1600">
+                      <a:endParaRPr lang="en-US" sz="1600" dirty="0">
                         <a:effectLst/>
                         <a:latin typeface="Calibri" panose="020F0502020204030204" pitchFamily="34" charset="0"/>
                         <a:ea typeface="Calibri" panose="020F0502020204030204" pitchFamily="34" charset="0"/>
@@ -15615,18 +15620,18 @@
                         </a:spcAft>
                       </a:pPr>
                       <a:r>
-                        <a:rPr lang="en-US" sz="1600">
+                        <a:rPr lang="en-US" sz="1600" dirty="0">
                           <a:effectLst/>
                         </a:rPr>
                         <a:t>Moderate pCO</a:t>
                       </a:r>
                       <a:r>
-                        <a:rPr lang="en-US" sz="1600" baseline="-25000">
+                        <a:rPr lang="en-US" sz="1600" baseline="-25000" dirty="0">
                           <a:effectLst/>
                         </a:rPr>
                         <a:t>2</a:t>
                       </a:r>
-                      <a:endParaRPr lang="en-US" sz="1600">
+                      <a:endParaRPr lang="en-US" sz="1600" dirty="0">
                         <a:effectLst/>
                         <a:latin typeface="Calibri" panose="020F0502020204030204" pitchFamily="34" charset="0"/>
                         <a:ea typeface="Calibri" panose="020F0502020204030204" pitchFamily="34" charset="0"/>
@@ -16835,6 +16840,1333 @@
 </p:sld>
 </file>
 
+<file path=ppt/slides/slide18.xml><?xml version="1.0" encoding="utf-8"?>
+<p:sld xmlns:a="http://schemas.openxmlformats.org/drawingml/2006/main" xmlns:r="http://schemas.openxmlformats.org/officeDocument/2006/relationships" xmlns:p="http://schemas.openxmlformats.org/presentationml/2006/main">
+  <p:cSld>
+    <p:spTree>
+      <p:nvGrpSpPr>
+        <p:cNvPr id="1" name=""/>
+        <p:cNvGrpSpPr/>
+        <p:nvPr/>
+      </p:nvGrpSpPr>
+      <p:grpSpPr>
+        <a:xfrm>
+          <a:off x="0" y="0"/>
+          <a:ext cx="0" cy="0"/>
+          <a:chOff x="0" y="0"/>
+          <a:chExt cx="0" cy="0"/>
+        </a:xfrm>
+      </p:grpSpPr>
+      <p:sp>
+        <p:nvSpPr>
+          <p:cNvPr id="2" name="Title 1">
+            <a:extLst>
+              <a:ext uri="{FF2B5EF4-FFF2-40B4-BE49-F238E27FC236}">
+                <a16:creationId xmlns:a16="http://schemas.microsoft.com/office/drawing/2014/main" id="{B93BD5B3-F627-0D5E-A427-157D0B986D03}"/>
+              </a:ext>
+            </a:extLst>
+          </p:cNvPr>
+          <p:cNvSpPr>
+            <a:spLocks noGrp="1"/>
+          </p:cNvSpPr>
+          <p:nvPr>
+            <p:ph type="title"/>
+          </p:nvPr>
+        </p:nvSpPr>
+        <p:spPr/>
+        <p:txBody>
+          <a:bodyPr/>
+          <a:lstStyle/>
+          <a:p>
+            <a:r>
+              <a:rPr lang="en-US" dirty="0"/>
+              <a:t>Extra slides</a:t>
+            </a:r>
+          </a:p>
+        </p:txBody>
+      </p:sp>
+    </p:spTree>
+    <p:extLst>
+      <p:ext uri="{BB962C8B-B14F-4D97-AF65-F5344CB8AC3E}">
+        <p14:creationId xmlns:p14="http://schemas.microsoft.com/office/powerpoint/2010/main" val="2688556944"/>
+      </p:ext>
+    </p:extLst>
+  </p:cSld>
+  <p:clrMapOvr>
+    <a:masterClrMapping/>
+  </p:clrMapOvr>
+</p:sld>
+</file>
+
+<file path=ppt/slides/slide19.xml><?xml version="1.0" encoding="utf-8"?>
+<p:sld xmlns:a="http://schemas.openxmlformats.org/drawingml/2006/main" xmlns:r="http://schemas.openxmlformats.org/officeDocument/2006/relationships" xmlns:p="http://schemas.openxmlformats.org/presentationml/2006/main">
+  <p:cSld>
+    <p:spTree>
+      <p:nvGrpSpPr>
+        <p:cNvPr id="1" name=""/>
+        <p:cNvGrpSpPr/>
+        <p:nvPr/>
+      </p:nvGrpSpPr>
+      <p:grpSpPr>
+        <a:xfrm>
+          <a:off x="0" y="0"/>
+          <a:ext cx="0" cy="0"/>
+          <a:chOff x="0" y="0"/>
+          <a:chExt cx="0" cy="0"/>
+        </a:xfrm>
+      </p:grpSpPr>
+      <mc:AlternateContent xmlns:mc="http://schemas.openxmlformats.org/markup-compatibility/2006" xmlns:a14="http://schemas.microsoft.com/office/drawing/2010/main">
+        <mc:Choice Requires="a14">
+          <p:sp>
+            <p:nvSpPr>
+              <p:cNvPr id="3" name="Content Placeholder 2">
+                <a:extLst>
+                  <a:ext uri="{FF2B5EF4-FFF2-40B4-BE49-F238E27FC236}">
+                    <a16:creationId xmlns:a16="http://schemas.microsoft.com/office/drawing/2014/main" id="{3DD3BF68-1537-2790-69C1-090B3C6B1398}"/>
+                  </a:ext>
+                </a:extLst>
+              </p:cNvPr>
+              <p:cNvSpPr>
+                <a:spLocks noGrp="1"/>
+              </p:cNvSpPr>
+              <p:nvPr>
+                <p:ph idx="1"/>
+              </p:nvPr>
+            </p:nvSpPr>
+            <p:spPr>
+              <a:xfrm>
+                <a:off x="838200" y="289367"/>
+                <a:ext cx="10515600" cy="6227180"/>
+              </a:xfrm>
+            </p:spPr>
+            <p:txBody>
+              <a:bodyPr>
+                <a:normAutofit fontScale="85000" lnSpcReduction="10000"/>
+              </a:bodyPr>
+              <a:lstStyle/>
+              <a:p>
+                <a:pPr marL="0" marR="0" indent="0">
+                  <a:lnSpc>
+                    <a:spcPct val="160000"/>
+                  </a:lnSpc>
+                  <a:spcBef>
+                    <a:spcPts val="0"/>
+                  </a:spcBef>
+                  <a:spcAft>
+                    <a:spcPts val="800"/>
+                  </a:spcAft>
+                  <a:buNone/>
+                </a:pPr>
+                <a14:m>
+                  <m:oMathPara xmlns:m="http://schemas.openxmlformats.org/officeDocument/2006/math">
+                    <m:oMathParaPr>
+                      <m:jc m:val="centerGroup"/>
+                    </m:oMathParaPr>
+                    <m:oMath xmlns:m="http://schemas.openxmlformats.org/officeDocument/2006/math">
+                      <m:sSub>
+                        <m:sSubPr>
+                          <m:ctrlPr>
+                            <a:rPr lang="en-US" sz="3200" i="1" smtClean="0">
+                              <a:effectLst/>
+                              <a:latin typeface="Cambria Math" panose="02040503050406030204" pitchFamily="18" charset="0"/>
+                              <a:ea typeface="Calibri" panose="020F0502020204030204" pitchFamily="34" charset="0"/>
+                              <a:cs typeface="Times New Roman" panose="02020603050405020304" pitchFamily="18" charset="0"/>
+                            </a:rPr>
+                          </m:ctrlPr>
+                        </m:sSubPr>
+                        <m:e>
+                          <m:r>
+                            <a:rPr lang="en-US" sz="3200" i="1">
+                              <a:effectLst/>
+                              <a:latin typeface="Cambria Math" panose="02040503050406030204" pitchFamily="18" charset="0"/>
+                              <a:ea typeface="Calibri" panose="020F0502020204030204" pitchFamily="34" charset="0"/>
+                              <a:cs typeface="Times New Roman" panose="02020603050405020304" pitchFamily="18" charset="0"/>
+                            </a:rPr>
+                            <m:t>𝑀</m:t>
+                          </m:r>
+                        </m:e>
+                        <m:sub>
+                          <m:r>
+                            <a:rPr lang="en-US" sz="3200" i="1">
+                              <a:effectLst/>
+                              <a:latin typeface="Cambria Math" panose="02040503050406030204" pitchFamily="18" charset="0"/>
+                              <a:ea typeface="Calibri" panose="020F0502020204030204" pitchFamily="34" charset="0"/>
+                              <a:cs typeface="Times New Roman" panose="02020603050405020304" pitchFamily="18" charset="0"/>
+                            </a:rPr>
+                            <m:t>𝑉</m:t>
+                          </m:r>
+                        </m:sub>
+                      </m:sSub>
+                      <m:r>
+                        <a:rPr lang="en-US" sz="3200" i="1">
+                          <a:effectLst/>
+                          <a:latin typeface="Cambria Math" panose="02040503050406030204" pitchFamily="18" charset="0"/>
+                          <a:ea typeface="Calibri" panose="020F0502020204030204" pitchFamily="34" charset="0"/>
+                          <a:cs typeface="Times New Roman" panose="02020603050405020304" pitchFamily="18" charset="0"/>
+                        </a:rPr>
+                        <m:t>=</m:t>
+                      </m:r>
+                      <m:sSub>
+                        <m:sSubPr>
+                          <m:ctrlPr>
+                            <a:rPr lang="en-US" sz="3200" i="1">
+                              <a:effectLst/>
+                              <a:latin typeface="Cambria Math" panose="02040503050406030204" pitchFamily="18" charset="0"/>
+                              <a:ea typeface="Calibri" panose="020F0502020204030204" pitchFamily="34" charset="0"/>
+                              <a:cs typeface="Times New Roman" panose="02020603050405020304" pitchFamily="18" charset="0"/>
+                            </a:rPr>
+                          </m:ctrlPr>
+                        </m:sSubPr>
+                        <m:e>
+                          <m:r>
+                            <a:rPr lang="en-US" sz="3200" i="1">
+                              <a:effectLst/>
+                              <a:latin typeface="Cambria Math" panose="02040503050406030204" pitchFamily="18" charset="0"/>
+                              <a:ea typeface="Calibri" panose="020F0502020204030204" pitchFamily="34" charset="0"/>
+                              <a:cs typeface="Times New Roman" panose="02020603050405020304" pitchFamily="18" charset="0"/>
+                            </a:rPr>
+                            <m:t>𝑀</m:t>
+                          </m:r>
+                        </m:e>
+                        <m:sub>
+                          <m:r>
+                            <a:rPr lang="en-US" sz="3200" i="1">
+                              <a:effectLst/>
+                              <a:latin typeface="Cambria Math" panose="02040503050406030204" pitchFamily="18" charset="0"/>
+                              <a:ea typeface="Calibri" panose="020F0502020204030204" pitchFamily="34" charset="0"/>
+                              <a:cs typeface="Times New Roman" panose="02020603050405020304" pitchFamily="18" charset="0"/>
+                            </a:rPr>
+                            <m:t>𝑉</m:t>
+                          </m:r>
+                          <m:r>
+                            <a:rPr lang="en-US" sz="3200" i="1">
+                              <a:effectLst/>
+                              <a:latin typeface="Cambria Math" panose="02040503050406030204" pitchFamily="18" charset="0"/>
+                              <a:ea typeface="Calibri" panose="020F0502020204030204" pitchFamily="34" charset="0"/>
+                              <a:cs typeface="Times New Roman" panose="02020603050405020304" pitchFamily="18" charset="0"/>
+                            </a:rPr>
+                            <m:t>0</m:t>
+                          </m:r>
+                        </m:sub>
+                      </m:sSub>
+                      <m:sSup>
+                        <m:sSupPr>
+                          <m:ctrlPr>
+                            <a:rPr lang="en-US" sz="3200" i="1">
+                              <a:effectLst/>
+                              <a:latin typeface="Cambria Math" panose="02040503050406030204" pitchFamily="18" charset="0"/>
+                              <a:ea typeface="Calibri" panose="020F0502020204030204" pitchFamily="34" charset="0"/>
+                              <a:cs typeface="Times New Roman" panose="02020603050405020304" pitchFamily="18" charset="0"/>
+                            </a:rPr>
+                          </m:ctrlPr>
+                        </m:sSupPr>
+                        <m:e>
+                          <m:r>
+                            <a:rPr lang="en-US" sz="3200" i="1">
+                              <a:effectLst/>
+                              <a:latin typeface="Cambria Math" panose="02040503050406030204" pitchFamily="18" charset="0"/>
+                              <a:ea typeface="Calibri" panose="020F0502020204030204" pitchFamily="34" charset="0"/>
+                              <a:cs typeface="Times New Roman" panose="02020603050405020304" pitchFamily="18" charset="0"/>
+                            </a:rPr>
+                            <m:t>𝑒</m:t>
+                          </m:r>
+                        </m:e>
+                        <m:sup>
+                          <m:sSub>
+                            <m:sSubPr>
+                              <m:ctrlPr>
+                                <a:rPr lang="en-US" sz="3200" i="1">
+                                  <a:effectLst/>
+                                  <a:latin typeface="Cambria Math" panose="02040503050406030204" pitchFamily="18" charset="0"/>
+                                  <a:ea typeface="Calibri" panose="020F0502020204030204" pitchFamily="34" charset="0"/>
+                                  <a:cs typeface="Times New Roman" panose="02020603050405020304" pitchFamily="18" charset="0"/>
+                                </a:rPr>
+                              </m:ctrlPr>
+                            </m:sSubPr>
+                            <m:e>
+                              <m:r>
+                                <a:rPr lang="en-US" sz="3200" i="1">
+                                  <a:effectLst/>
+                                  <a:latin typeface="Cambria Math" panose="02040503050406030204" pitchFamily="18" charset="0"/>
+                                  <a:ea typeface="Calibri" panose="020F0502020204030204" pitchFamily="34" charset="0"/>
+                                  <a:cs typeface="Times New Roman" panose="02020603050405020304" pitchFamily="18" charset="0"/>
+                                </a:rPr>
+                                <m:t>−</m:t>
+                              </m:r>
+                              <m:r>
+                                <a:rPr lang="en-US" sz="3200" i="1">
+                                  <a:effectLst/>
+                                  <a:latin typeface="Cambria Math" panose="02040503050406030204" pitchFamily="18" charset="0"/>
+                                  <a:ea typeface="Calibri" panose="020F0502020204030204" pitchFamily="34" charset="0"/>
+                                  <a:cs typeface="Times New Roman" panose="02020603050405020304" pitchFamily="18" charset="0"/>
+                                </a:rPr>
+                                <m:t>𝑘</m:t>
+                              </m:r>
+                            </m:e>
+                            <m:sub>
+                              <m:r>
+                                <a:rPr lang="en-US" sz="3200" i="1">
+                                  <a:effectLst/>
+                                  <a:latin typeface="Cambria Math" panose="02040503050406030204" pitchFamily="18" charset="0"/>
+                                  <a:ea typeface="Calibri" panose="020F0502020204030204" pitchFamily="34" charset="0"/>
+                                  <a:cs typeface="Times New Roman" panose="02020603050405020304" pitchFamily="18" charset="0"/>
+                                </a:rPr>
+                                <m:t>𝑀</m:t>
+                              </m:r>
+                              <m:r>
+                                <a:rPr lang="en-US" sz="3200" i="1">
+                                  <a:effectLst/>
+                                  <a:latin typeface="Cambria Math" panose="02040503050406030204" pitchFamily="18" charset="0"/>
+                                  <a:ea typeface="Calibri" panose="020F0502020204030204" pitchFamily="34" charset="0"/>
+                                  <a:cs typeface="Times New Roman" panose="02020603050405020304" pitchFamily="18" charset="0"/>
+                                </a:rPr>
+                                <m:t>0</m:t>
+                              </m:r>
+                            </m:sub>
+                          </m:sSub>
+                          <m:r>
+                            <a:rPr lang="en-US" sz="3200" i="1">
+                              <a:effectLst/>
+                              <a:latin typeface="Cambria Math" panose="02040503050406030204" pitchFamily="18" charset="0"/>
+                              <a:ea typeface="Calibri" panose="020F0502020204030204" pitchFamily="34" charset="0"/>
+                              <a:cs typeface="Times New Roman" panose="02020603050405020304" pitchFamily="18" charset="0"/>
+                            </a:rPr>
+                            <m:t>𝑡</m:t>
+                          </m:r>
+                        </m:sup>
+                      </m:sSup>
+                    </m:oMath>
+                  </m:oMathPara>
+                </a14:m>
+                <a:endParaRPr lang="en-US" sz="3200" dirty="0">
+                  <a:effectLst/>
+                  <a:latin typeface="Calibri" panose="020F0502020204030204" pitchFamily="34" charset="0"/>
+                  <a:ea typeface="Calibri" panose="020F0502020204030204" pitchFamily="34" charset="0"/>
+                  <a:cs typeface="Times New Roman" panose="02020603050405020304" pitchFamily="18" charset="0"/>
+                </a:endParaRPr>
+              </a:p>
+              <a:p>
+                <a:pPr marL="0" marR="0" indent="0">
+                  <a:lnSpc>
+                    <a:spcPct val="160000"/>
+                  </a:lnSpc>
+                  <a:spcBef>
+                    <a:spcPts val="0"/>
+                  </a:spcBef>
+                  <a:spcAft>
+                    <a:spcPts val="800"/>
+                  </a:spcAft>
+                  <a:buNone/>
+                </a:pPr>
+                <a14:m>
+                  <m:oMathPara xmlns:m="http://schemas.openxmlformats.org/officeDocument/2006/math">
+                    <m:oMathParaPr>
+                      <m:jc m:val="centerGroup"/>
+                    </m:oMathParaPr>
+                    <m:oMath xmlns:m="http://schemas.openxmlformats.org/officeDocument/2006/math">
+                      <m:f>
+                        <m:fPr>
+                          <m:ctrlPr>
+                            <a:rPr lang="en-US" sz="3200" i="1">
+                              <a:effectLst/>
+                              <a:latin typeface="Cambria Math" panose="02040503050406030204" pitchFamily="18" charset="0"/>
+                              <a:ea typeface="Calibri" panose="020F0502020204030204" pitchFamily="34" charset="0"/>
+                              <a:cs typeface="Times New Roman" panose="02020603050405020304" pitchFamily="18" charset="0"/>
+                            </a:rPr>
+                          </m:ctrlPr>
+                        </m:fPr>
+                        <m:num>
+                          <m:sSub>
+                            <m:sSubPr>
+                              <m:ctrlPr>
+                                <a:rPr lang="en-US" sz="3200" i="1">
+                                  <a:effectLst/>
+                                  <a:latin typeface="Cambria Math" panose="02040503050406030204" pitchFamily="18" charset="0"/>
+                                  <a:ea typeface="Calibri" panose="020F0502020204030204" pitchFamily="34" charset="0"/>
+                                  <a:cs typeface="Times New Roman" panose="02020603050405020304" pitchFamily="18" charset="0"/>
+                                </a:rPr>
+                              </m:ctrlPr>
+                            </m:sSubPr>
+                            <m:e>
+                              <m:r>
+                                <a:rPr lang="en-US" sz="3200" i="1">
+                                  <a:effectLst/>
+                                  <a:latin typeface="Cambria Math" panose="02040503050406030204" pitchFamily="18" charset="0"/>
+                                  <a:ea typeface="Calibri" panose="020F0502020204030204" pitchFamily="34" charset="0"/>
+                                  <a:cs typeface="Times New Roman" panose="02020603050405020304" pitchFamily="18" charset="0"/>
+                                </a:rPr>
+                                <m:t>𝑀</m:t>
+                              </m:r>
+                            </m:e>
+                            <m:sub>
+                              <m:r>
+                                <a:rPr lang="en-US" sz="3200" i="1">
+                                  <a:effectLst/>
+                                  <a:latin typeface="Cambria Math" panose="02040503050406030204" pitchFamily="18" charset="0"/>
+                                  <a:ea typeface="Calibri" panose="020F0502020204030204" pitchFamily="34" charset="0"/>
+                                  <a:cs typeface="Times New Roman" panose="02020603050405020304" pitchFamily="18" charset="0"/>
+                                </a:rPr>
+                                <m:t>𝑉</m:t>
+                              </m:r>
+                            </m:sub>
+                          </m:sSub>
+                        </m:num>
+                        <m:den>
+                          <m:sSub>
+                            <m:sSubPr>
+                              <m:ctrlPr>
+                                <a:rPr lang="en-US" sz="3200" i="1">
+                                  <a:effectLst/>
+                                  <a:latin typeface="Cambria Math" panose="02040503050406030204" pitchFamily="18" charset="0"/>
+                                  <a:ea typeface="Calibri" panose="020F0502020204030204" pitchFamily="34" charset="0"/>
+                                  <a:cs typeface="Times New Roman" panose="02020603050405020304" pitchFamily="18" charset="0"/>
+                                </a:rPr>
+                              </m:ctrlPr>
+                            </m:sSubPr>
+                            <m:e>
+                              <m:r>
+                                <a:rPr lang="en-US" sz="3200" i="1">
+                                  <a:effectLst/>
+                                  <a:latin typeface="Cambria Math" panose="02040503050406030204" pitchFamily="18" charset="0"/>
+                                  <a:ea typeface="Calibri" panose="020F0502020204030204" pitchFamily="34" charset="0"/>
+                                  <a:cs typeface="Times New Roman" panose="02020603050405020304" pitchFamily="18" charset="0"/>
+                                </a:rPr>
+                                <m:t>𝑀</m:t>
+                              </m:r>
+                            </m:e>
+                            <m:sub>
+                              <m:r>
+                                <a:rPr lang="en-US" sz="3200" i="1">
+                                  <a:effectLst/>
+                                  <a:latin typeface="Cambria Math" panose="02040503050406030204" pitchFamily="18" charset="0"/>
+                                  <a:ea typeface="Calibri" panose="020F0502020204030204" pitchFamily="34" charset="0"/>
+                                  <a:cs typeface="Times New Roman" panose="02020603050405020304" pitchFamily="18" charset="0"/>
+                                </a:rPr>
+                                <m:t>𝑉</m:t>
+                              </m:r>
+                              <m:r>
+                                <a:rPr lang="en-US" sz="3200" i="1">
+                                  <a:effectLst/>
+                                  <a:latin typeface="Cambria Math" panose="02040503050406030204" pitchFamily="18" charset="0"/>
+                                  <a:ea typeface="Calibri" panose="020F0502020204030204" pitchFamily="34" charset="0"/>
+                                  <a:cs typeface="Times New Roman" panose="02020603050405020304" pitchFamily="18" charset="0"/>
+                                </a:rPr>
+                                <m:t>0</m:t>
+                              </m:r>
+                            </m:sub>
+                          </m:sSub>
+                        </m:den>
+                      </m:f>
+                      <m:r>
+                        <a:rPr lang="en-US" sz="3200" i="1">
+                          <a:effectLst/>
+                          <a:latin typeface="Cambria Math" panose="02040503050406030204" pitchFamily="18" charset="0"/>
+                          <a:ea typeface="Calibri" panose="020F0502020204030204" pitchFamily="34" charset="0"/>
+                          <a:cs typeface="Times New Roman" panose="02020603050405020304" pitchFamily="18" charset="0"/>
+                        </a:rPr>
+                        <m:t>=</m:t>
+                      </m:r>
+                      <m:sSup>
+                        <m:sSupPr>
+                          <m:ctrlPr>
+                            <a:rPr lang="en-US" sz="3200" i="1">
+                              <a:effectLst/>
+                              <a:latin typeface="Cambria Math" panose="02040503050406030204" pitchFamily="18" charset="0"/>
+                              <a:ea typeface="Calibri" panose="020F0502020204030204" pitchFamily="34" charset="0"/>
+                              <a:cs typeface="Times New Roman" panose="02020603050405020304" pitchFamily="18" charset="0"/>
+                            </a:rPr>
+                          </m:ctrlPr>
+                        </m:sSupPr>
+                        <m:e>
+                          <m:r>
+                            <a:rPr lang="en-US" sz="3200" i="1">
+                              <a:effectLst/>
+                              <a:latin typeface="Cambria Math" panose="02040503050406030204" pitchFamily="18" charset="0"/>
+                              <a:ea typeface="Calibri" panose="020F0502020204030204" pitchFamily="34" charset="0"/>
+                              <a:cs typeface="Times New Roman" panose="02020603050405020304" pitchFamily="18" charset="0"/>
+                            </a:rPr>
+                            <m:t>𝑒</m:t>
+                          </m:r>
+                        </m:e>
+                        <m:sup>
+                          <m:sSub>
+                            <m:sSubPr>
+                              <m:ctrlPr>
+                                <a:rPr lang="en-US" sz="3200" i="1">
+                                  <a:effectLst/>
+                                  <a:latin typeface="Cambria Math" panose="02040503050406030204" pitchFamily="18" charset="0"/>
+                                  <a:ea typeface="Calibri" panose="020F0502020204030204" pitchFamily="34" charset="0"/>
+                                  <a:cs typeface="Times New Roman" panose="02020603050405020304" pitchFamily="18" charset="0"/>
+                                </a:rPr>
+                              </m:ctrlPr>
+                            </m:sSubPr>
+                            <m:e>
+                              <m:r>
+                                <a:rPr lang="en-US" sz="3200" i="1">
+                                  <a:effectLst/>
+                                  <a:latin typeface="Cambria Math" panose="02040503050406030204" pitchFamily="18" charset="0"/>
+                                  <a:ea typeface="Calibri" panose="020F0502020204030204" pitchFamily="34" charset="0"/>
+                                  <a:cs typeface="Times New Roman" panose="02020603050405020304" pitchFamily="18" charset="0"/>
+                                </a:rPr>
+                                <m:t>−</m:t>
+                              </m:r>
+                              <m:r>
+                                <a:rPr lang="en-US" sz="3200" i="1">
+                                  <a:effectLst/>
+                                  <a:latin typeface="Cambria Math" panose="02040503050406030204" pitchFamily="18" charset="0"/>
+                                  <a:ea typeface="Calibri" panose="020F0502020204030204" pitchFamily="34" charset="0"/>
+                                  <a:cs typeface="Times New Roman" panose="02020603050405020304" pitchFamily="18" charset="0"/>
+                                </a:rPr>
+                                <m:t>𝑘</m:t>
+                              </m:r>
+                            </m:e>
+                            <m:sub>
+                              <m:r>
+                                <a:rPr lang="en-US" sz="3200" i="1">
+                                  <a:effectLst/>
+                                  <a:latin typeface="Cambria Math" panose="02040503050406030204" pitchFamily="18" charset="0"/>
+                                  <a:ea typeface="Calibri" panose="020F0502020204030204" pitchFamily="34" charset="0"/>
+                                  <a:cs typeface="Times New Roman" panose="02020603050405020304" pitchFamily="18" charset="0"/>
+                                </a:rPr>
+                                <m:t>𝑀</m:t>
+                              </m:r>
+                              <m:r>
+                                <a:rPr lang="en-US" sz="3200" i="1">
+                                  <a:effectLst/>
+                                  <a:latin typeface="Cambria Math" panose="02040503050406030204" pitchFamily="18" charset="0"/>
+                                  <a:ea typeface="Calibri" panose="020F0502020204030204" pitchFamily="34" charset="0"/>
+                                  <a:cs typeface="Times New Roman" panose="02020603050405020304" pitchFamily="18" charset="0"/>
+                                </a:rPr>
+                                <m:t>0</m:t>
+                              </m:r>
+                            </m:sub>
+                          </m:sSub>
+                          <m:r>
+                            <a:rPr lang="en-US" sz="3200" i="1">
+                              <a:effectLst/>
+                              <a:latin typeface="Cambria Math" panose="02040503050406030204" pitchFamily="18" charset="0"/>
+                              <a:ea typeface="Calibri" panose="020F0502020204030204" pitchFamily="34" charset="0"/>
+                              <a:cs typeface="Times New Roman" panose="02020603050405020304" pitchFamily="18" charset="0"/>
+                            </a:rPr>
+                            <m:t>𝑡</m:t>
+                          </m:r>
+                        </m:sup>
+                      </m:sSup>
+                    </m:oMath>
+                  </m:oMathPara>
+                </a14:m>
+                <a:endParaRPr lang="en-US" sz="3200" dirty="0">
+                  <a:effectLst/>
+                  <a:latin typeface="Calibri" panose="020F0502020204030204" pitchFamily="34" charset="0"/>
+                  <a:ea typeface="Calibri" panose="020F0502020204030204" pitchFamily="34" charset="0"/>
+                  <a:cs typeface="Times New Roman" panose="02020603050405020304" pitchFamily="18" charset="0"/>
+                </a:endParaRPr>
+              </a:p>
+              <a:p>
+                <a:pPr marL="0" marR="0" indent="0">
+                  <a:lnSpc>
+                    <a:spcPct val="160000"/>
+                  </a:lnSpc>
+                  <a:spcBef>
+                    <a:spcPts val="0"/>
+                  </a:spcBef>
+                  <a:spcAft>
+                    <a:spcPts val="800"/>
+                  </a:spcAft>
+                  <a:buNone/>
+                </a:pPr>
+                <a14:m>
+                  <m:oMathPara xmlns:m="http://schemas.openxmlformats.org/officeDocument/2006/math">
+                    <m:oMathParaPr>
+                      <m:jc m:val="centerGroup"/>
+                    </m:oMathParaPr>
+                    <m:oMath xmlns:m="http://schemas.openxmlformats.org/officeDocument/2006/math">
+                      <m:r>
+                        <a:rPr lang="en-US" sz="3200" i="1">
+                          <a:effectLst/>
+                          <a:latin typeface="Cambria Math" panose="02040503050406030204" pitchFamily="18" charset="0"/>
+                          <a:ea typeface="Calibri" panose="020F0502020204030204" pitchFamily="34" charset="0"/>
+                          <a:cs typeface="Times New Roman" panose="02020603050405020304" pitchFamily="18" charset="0"/>
+                        </a:rPr>
+                        <m:t>−</m:t>
+                      </m:r>
+                      <m:r>
+                        <m:rPr>
+                          <m:sty m:val="p"/>
+                        </m:rPr>
+                        <a:rPr lang="en-US" sz="3200">
+                          <a:effectLst/>
+                          <a:latin typeface="Cambria Math" panose="02040503050406030204" pitchFamily="18" charset="0"/>
+                          <a:ea typeface="Calibri" panose="020F0502020204030204" pitchFamily="34" charset="0"/>
+                          <a:cs typeface="Times New Roman" panose="02020603050405020304" pitchFamily="18" charset="0"/>
+                        </a:rPr>
+                        <m:t>ln</m:t>
+                      </m:r>
+                      <m:r>
+                        <a:rPr lang="en-US" sz="3200">
+                          <a:effectLst/>
+                          <a:latin typeface="Cambria Math" panose="02040503050406030204" pitchFamily="18" charset="0"/>
+                          <a:ea typeface="Calibri" panose="020F0502020204030204" pitchFamily="34" charset="0"/>
+                          <a:cs typeface="Times New Roman" panose="02020603050405020304" pitchFamily="18" charset="0"/>
+                        </a:rPr>
+                        <m:t>⁡</m:t>
+                      </m:r>
+                      <m:d>
+                        <m:dPr>
+                          <m:ctrlPr>
+                            <a:rPr lang="en-US" sz="3200" i="1">
+                              <a:effectLst/>
+                              <a:latin typeface="Cambria Math" panose="02040503050406030204" pitchFamily="18" charset="0"/>
+                              <a:ea typeface="Calibri" panose="020F0502020204030204" pitchFamily="34" charset="0"/>
+                              <a:cs typeface="Times New Roman" panose="02020603050405020304" pitchFamily="18" charset="0"/>
+                            </a:rPr>
+                          </m:ctrlPr>
+                        </m:dPr>
+                        <m:e>
+                          <m:f>
+                            <m:fPr>
+                              <m:ctrlPr>
+                                <a:rPr lang="en-US" sz="3200" i="1">
+                                  <a:effectLst/>
+                                  <a:latin typeface="Cambria Math" panose="02040503050406030204" pitchFamily="18" charset="0"/>
+                                  <a:ea typeface="Calibri" panose="020F0502020204030204" pitchFamily="34" charset="0"/>
+                                  <a:cs typeface="Times New Roman" panose="02020603050405020304" pitchFamily="18" charset="0"/>
+                                </a:rPr>
+                              </m:ctrlPr>
+                            </m:fPr>
+                            <m:num>
+                              <m:sSub>
+                                <m:sSubPr>
+                                  <m:ctrlPr>
+                                    <a:rPr lang="en-US" sz="3200" i="1">
+                                      <a:effectLst/>
+                                      <a:latin typeface="Cambria Math" panose="02040503050406030204" pitchFamily="18" charset="0"/>
+                                      <a:ea typeface="Calibri" panose="020F0502020204030204" pitchFamily="34" charset="0"/>
+                                      <a:cs typeface="Times New Roman" panose="02020603050405020304" pitchFamily="18" charset="0"/>
+                                    </a:rPr>
+                                  </m:ctrlPr>
+                                </m:sSubPr>
+                                <m:e>
+                                  <m:r>
+                                    <a:rPr lang="en-US" sz="3200" i="1">
+                                      <a:effectLst/>
+                                      <a:latin typeface="Cambria Math" panose="02040503050406030204" pitchFamily="18" charset="0"/>
+                                      <a:ea typeface="Calibri" panose="020F0502020204030204" pitchFamily="34" charset="0"/>
+                                      <a:cs typeface="Times New Roman" panose="02020603050405020304" pitchFamily="18" charset="0"/>
+                                    </a:rPr>
+                                    <m:t>𝑀</m:t>
+                                  </m:r>
+                                </m:e>
+                                <m:sub>
+                                  <m:r>
+                                    <a:rPr lang="en-US" sz="3200" i="1">
+                                      <a:effectLst/>
+                                      <a:latin typeface="Cambria Math" panose="02040503050406030204" pitchFamily="18" charset="0"/>
+                                      <a:ea typeface="Calibri" panose="020F0502020204030204" pitchFamily="34" charset="0"/>
+                                      <a:cs typeface="Times New Roman" panose="02020603050405020304" pitchFamily="18" charset="0"/>
+                                    </a:rPr>
+                                    <m:t>𝑉</m:t>
+                                  </m:r>
+                                </m:sub>
+                              </m:sSub>
+                            </m:num>
+                            <m:den>
+                              <m:sSub>
+                                <m:sSubPr>
+                                  <m:ctrlPr>
+                                    <a:rPr lang="en-US" sz="3200" i="1">
+                                      <a:effectLst/>
+                                      <a:latin typeface="Cambria Math" panose="02040503050406030204" pitchFamily="18" charset="0"/>
+                                      <a:ea typeface="Calibri" panose="020F0502020204030204" pitchFamily="34" charset="0"/>
+                                      <a:cs typeface="Times New Roman" panose="02020603050405020304" pitchFamily="18" charset="0"/>
+                                    </a:rPr>
+                                  </m:ctrlPr>
+                                </m:sSubPr>
+                                <m:e>
+                                  <m:r>
+                                    <a:rPr lang="en-US" sz="3200" i="1">
+                                      <a:effectLst/>
+                                      <a:latin typeface="Cambria Math" panose="02040503050406030204" pitchFamily="18" charset="0"/>
+                                      <a:ea typeface="Calibri" panose="020F0502020204030204" pitchFamily="34" charset="0"/>
+                                      <a:cs typeface="Times New Roman" panose="02020603050405020304" pitchFamily="18" charset="0"/>
+                                    </a:rPr>
+                                    <m:t>𝑀</m:t>
+                                  </m:r>
+                                </m:e>
+                                <m:sub>
+                                  <m:r>
+                                    <a:rPr lang="en-US" sz="3200" i="1">
+                                      <a:effectLst/>
+                                      <a:latin typeface="Cambria Math" panose="02040503050406030204" pitchFamily="18" charset="0"/>
+                                      <a:ea typeface="Calibri" panose="020F0502020204030204" pitchFamily="34" charset="0"/>
+                                      <a:cs typeface="Times New Roman" panose="02020603050405020304" pitchFamily="18" charset="0"/>
+                                    </a:rPr>
+                                    <m:t>𝑉</m:t>
+                                  </m:r>
+                                  <m:r>
+                                    <a:rPr lang="en-US" sz="3200" i="1">
+                                      <a:effectLst/>
+                                      <a:latin typeface="Cambria Math" panose="02040503050406030204" pitchFamily="18" charset="0"/>
+                                      <a:ea typeface="Calibri" panose="020F0502020204030204" pitchFamily="34" charset="0"/>
+                                      <a:cs typeface="Times New Roman" panose="02020603050405020304" pitchFamily="18" charset="0"/>
+                                    </a:rPr>
+                                    <m:t>0</m:t>
+                                  </m:r>
+                                </m:sub>
+                              </m:sSub>
+                            </m:den>
+                          </m:f>
+                        </m:e>
+                      </m:d>
+                      <m:r>
+                        <a:rPr lang="en-US" sz="3200" i="1">
+                          <a:effectLst/>
+                          <a:latin typeface="Cambria Math" panose="02040503050406030204" pitchFamily="18" charset="0"/>
+                          <a:ea typeface="Calibri" panose="020F0502020204030204" pitchFamily="34" charset="0"/>
+                          <a:cs typeface="Times New Roman" panose="02020603050405020304" pitchFamily="18" charset="0"/>
+                        </a:rPr>
+                        <m:t>=</m:t>
+                      </m:r>
+                      <m:sSub>
+                        <m:sSubPr>
+                          <m:ctrlPr>
+                            <a:rPr lang="en-US" sz="3200" i="1">
+                              <a:effectLst/>
+                              <a:latin typeface="Cambria Math" panose="02040503050406030204" pitchFamily="18" charset="0"/>
+                              <a:ea typeface="Calibri" panose="020F0502020204030204" pitchFamily="34" charset="0"/>
+                              <a:cs typeface="Times New Roman" panose="02020603050405020304" pitchFamily="18" charset="0"/>
+                            </a:rPr>
+                          </m:ctrlPr>
+                        </m:sSubPr>
+                        <m:e>
+                          <m:r>
+                            <a:rPr lang="en-US" sz="3200" i="1">
+                              <a:effectLst/>
+                              <a:latin typeface="Cambria Math" panose="02040503050406030204" pitchFamily="18" charset="0"/>
+                              <a:ea typeface="Calibri" panose="020F0502020204030204" pitchFamily="34" charset="0"/>
+                              <a:cs typeface="Times New Roman" panose="02020603050405020304" pitchFamily="18" charset="0"/>
+                            </a:rPr>
+                            <m:t>𝑘</m:t>
+                          </m:r>
+                        </m:e>
+                        <m:sub>
+                          <m:r>
+                            <a:rPr lang="en-US" sz="3200" i="1">
+                              <a:effectLst/>
+                              <a:latin typeface="Cambria Math" panose="02040503050406030204" pitchFamily="18" charset="0"/>
+                              <a:ea typeface="Calibri" panose="020F0502020204030204" pitchFamily="34" charset="0"/>
+                              <a:cs typeface="Times New Roman" panose="02020603050405020304" pitchFamily="18" charset="0"/>
+                            </a:rPr>
+                            <m:t>𝑀</m:t>
+                          </m:r>
+                          <m:r>
+                            <a:rPr lang="en-US" sz="3200" i="1">
+                              <a:effectLst/>
+                              <a:latin typeface="Cambria Math" panose="02040503050406030204" pitchFamily="18" charset="0"/>
+                              <a:ea typeface="Calibri" panose="020F0502020204030204" pitchFamily="34" charset="0"/>
+                              <a:cs typeface="Times New Roman" panose="02020603050405020304" pitchFamily="18" charset="0"/>
+                            </a:rPr>
+                            <m:t>0</m:t>
+                          </m:r>
+                        </m:sub>
+                      </m:sSub>
+                      <m:r>
+                        <a:rPr lang="en-US" sz="3200" i="1">
+                          <a:effectLst/>
+                          <a:latin typeface="Cambria Math" panose="02040503050406030204" pitchFamily="18" charset="0"/>
+                          <a:ea typeface="Calibri" panose="020F0502020204030204" pitchFamily="34" charset="0"/>
+                          <a:cs typeface="Times New Roman" panose="02020603050405020304" pitchFamily="18" charset="0"/>
+                        </a:rPr>
+                        <m:t>𝑡</m:t>
+                      </m:r>
+                    </m:oMath>
+                  </m:oMathPara>
+                </a14:m>
+                <a:endParaRPr lang="en-US" sz="3200" dirty="0">
+                  <a:effectLst/>
+                  <a:latin typeface="Calibri" panose="020F0502020204030204" pitchFamily="34" charset="0"/>
+                  <a:ea typeface="Calibri" panose="020F0502020204030204" pitchFamily="34" charset="0"/>
+                  <a:cs typeface="Times New Roman" panose="02020603050405020304" pitchFamily="18" charset="0"/>
+                </a:endParaRPr>
+              </a:p>
+              <a:p>
+                <a:pPr marL="0" marR="0" indent="0">
+                  <a:lnSpc>
+                    <a:spcPct val="160000"/>
+                  </a:lnSpc>
+                  <a:spcBef>
+                    <a:spcPts val="0"/>
+                  </a:spcBef>
+                  <a:spcAft>
+                    <a:spcPts val="800"/>
+                  </a:spcAft>
+                  <a:buNone/>
+                </a:pPr>
+                <a14:m>
+                  <m:oMathPara xmlns:m="http://schemas.openxmlformats.org/officeDocument/2006/math">
+                    <m:oMathParaPr>
+                      <m:jc m:val="centerGroup"/>
+                    </m:oMathParaPr>
+                    <m:oMath xmlns:m="http://schemas.openxmlformats.org/officeDocument/2006/math">
+                      <m:func>
+                        <m:funcPr>
+                          <m:ctrlPr>
+                            <a:rPr lang="en-US" sz="3200" i="1">
+                              <a:effectLst/>
+                              <a:latin typeface="Cambria Math" panose="02040503050406030204" pitchFamily="18" charset="0"/>
+                              <a:ea typeface="Calibri" panose="020F0502020204030204" pitchFamily="34" charset="0"/>
+                              <a:cs typeface="Times New Roman" panose="02020603050405020304" pitchFamily="18" charset="0"/>
+                            </a:rPr>
+                          </m:ctrlPr>
+                        </m:funcPr>
+                        <m:fName>
+                          <m:r>
+                            <m:rPr>
+                              <m:sty m:val="p"/>
+                            </m:rPr>
+                            <a:rPr lang="en-US" sz="3200">
+                              <a:effectLst/>
+                              <a:latin typeface="Cambria Math" panose="02040503050406030204" pitchFamily="18" charset="0"/>
+                              <a:ea typeface="Calibri" panose="020F0502020204030204" pitchFamily="34" charset="0"/>
+                              <a:cs typeface="Times New Roman" panose="02020603050405020304" pitchFamily="18" charset="0"/>
+                            </a:rPr>
+                            <m:t>ln</m:t>
+                          </m:r>
+                        </m:fName>
+                        <m:e>
+                          <m:d>
+                            <m:dPr>
+                              <m:ctrlPr>
+                                <a:rPr lang="en-US" sz="3200" i="1">
+                                  <a:effectLst/>
+                                  <a:latin typeface="Cambria Math" panose="02040503050406030204" pitchFamily="18" charset="0"/>
+                                  <a:ea typeface="Calibri" panose="020F0502020204030204" pitchFamily="34" charset="0"/>
+                                  <a:cs typeface="Times New Roman" panose="02020603050405020304" pitchFamily="18" charset="0"/>
+                                </a:rPr>
+                              </m:ctrlPr>
+                            </m:dPr>
+                            <m:e>
+                              <m:sSub>
+                                <m:sSubPr>
+                                  <m:ctrlPr>
+                                    <a:rPr lang="en-US" sz="3200" i="1">
+                                      <a:effectLst/>
+                                      <a:latin typeface="Cambria Math" panose="02040503050406030204" pitchFamily="18" charset="0"/>
+                                      <a:ea typeface="Calibri" panose="020F0502020204030204" pitchFamily="34" charset="0"/>
+                                      <a:cs typeface="Times New Roman" panose="02020603050405020304" pitchFamily="18" charset="0"/>
+                                    </a:rPr>
+                                  </m:ctrlPr>
+                                </m:sSubPr>
+                                <m:e>
+                                  <m:r>
+                                    <a:rPr lang="en-US" sz="3200" i="1">
+                                      <a:effectLst/>
+                                      <a:latin typeface="Cambria Math" panose="02040503050406030204" pitchFamily="18" charset="0"/>
+                                      <a:ea typeface="Calibri" panose="020F0502020204030204" pitchFamily="34" charset="0"/>
+                                      <a:cs typeface="Times New Roman" panose="02020603050405020304" pitchFamily="18" charset="0"/>
+                                    </a:rPr>
+                                    <m:t>𝑀</m:t>
+                                  </m:r>
+                                </m:e>
+                                <m:sub>
+                                  <m:r>
+                                    <a:rPr lang="en-US" sz="3200" i="1">
+                                      <a:effectLst/>
+                                      <a:latin typeface="Cambria Math" panose="02040503050406030204" pitchFamily="18" charset="0"/>
+                                      <a:ea typeface="Calibri" panose="020F0502020204030204" pitchFamily="34" charset="0"/>
+                                      <a:cs typeface="Times New Roman" panose="02020603050405020304" pitchFamily="18" charset="0"/>
+                                    </a:rPr>
+                                    <m:t>𝑉</m:t>
+                                  </m:r>
+                                  <m:r>
+                                    <a:rPr lang="en-US" sz="3200" i="1">
+                                      <a:effectLst/>
+                                      <a:latin typeface="Cambria Math" panose="02040503050406030204" pitchFamily="18" charset="0"/>
+                                      <a:ea typeface="Calibri" panose="020F0502020204030204" pitchFamily="34" charset="0"/>
+                                      <a:cs typeface="Times New Roman" panose="02020603050405020304" pitchFamily="18" charset="0"/>
+                                    </a:rPr>
+                                    <m:t>0</m:t>
+                                  </m:r>
+                                </m:sub>
+                              </m:sSub>
+                            </m:e>
+                          </m:d>
+                        </m:e>
+                      </m:func>
+                      <m:r>
+                        <a:rPr lang="en-US" sz="3200" i="1">
+                          <a:effectLst/>
+                          <a:latin typeface="Cambria Math" panose="02040503050406030204" pitchFamily="18" charset="0"/>
+                          <a:ea typeface="Calibri" panose="020F0502020204030204" pitchFamily="34" charset="0"/>
+                          <a:cs typeface="Times New Roman" panose="02020603050405020304" pitchFamily="18" charset="0"/>
+                        </a:rPr>
+                        <m:t>−</m:t>
+                      </m:r>
+                      <m:r>
+                        <m:rPr>
+                          <m:sty m:val="p"/>
+                        </m:rPr>
+                        <a:rPr lang="en-US" sz="3200">
+                          <a:effectLst/>
+                          <a:latin typeface="Cambria Math" panose="02040503050406030204" pitchFamily="18" charset="0"/>
+                          <a:ea typeface="Calibri" panose="020F0502020204030204" pitchFamily="34" charset="0"/>
+                          <a:cs typeface="Times New Roman" panose="02020603050405020304" pitchFamily="18" charset="0"/>
+                        </a:rPr>
+                        <m:t>ln</m:t>
+                      </m:r>
+                      <m:r>
+                        <a:rPr lang="en-US" sz="3200">
+                          <a:effectLst/>
+                          <a:latin typeface="Cambria Math" panose="02040503050406030204" pitchFamily="18" charset="0"/>
+                          <a:ea typeface="Calibri" panose="020F0502020204030204" pitchFamily="34" charset="0"/>
+                          <a:cs typeface="Times New Roman" panose="02020603050405020304" pitchFamily="18" charset="0"/>
+                        </a:rPr>
+                        <m:t>⁡(</m:t>
+                      </m:r>
+                      <m:sSub>
+                        <m:sSubPr>
+                          <m:ctrlPr>
+                            <a:rPr lang="en-US" sz="3200" i="1">
+                              <a:effectLst/>
+                              <a:latin typeface="Cambria Math" panose="02040503050406030204" pitchFamily="18" charset="0"/>
+                              <a:ea typeface="Calibri" panose="020F0502020204030204" pitchFamily="34" charset="0"/>
+                              <a:cs typeface="Times New Roman" panose="02020603050405020304" pitchFamily="18" charset="0"/>
+                            </a:rPr>
+                          </m:ctrlPr>
+                        </m:sSubPr>
+                        <m:e>
+                          <m:r>
+                            <a:rPr lang="en-US" sz="3200" i="1">
+                              <a:effectLst/>
+                              <a:latin typeface="Cambria Math" panose="02040503050406030204" pitchFamily="18" charset="0"/>
+                              <a:ea typeface="Calibri" panose="020F0502020204030204" pitchFamily="34" charset="0"/>
+                              <a:cs typeface="Times New Roman" panose="02020603050405020304" pitchFamily="18" charset="0"/>
+                            </a:rPr>
+                            <m:t>𝑀</m:t>
+                          </m:r>
+                        </m:e>
+                        <m:sub>
+                          <m:r>
+                            <a:rPr lang="en-US" sz="3200" i="1">
+                              <a:effectLst/>
+                              <a:latin typeface="Cambria Math" panose="02040503050406030204" pitchFamily="18" charset="0"/>
+                              <a:ea typeface="Calibri" panose="020F0502020204030204" pitchFamily="34" charset="0"/>
+                              <a:cs typeface="Times New Roman" panose="02020603050405020304" pitchFamily="18" charset="0"/>
+                            </a:rPr>
+                            <m:t>𝑉</m:t>
+                          </m:r>
+                        </m:sub>
+                      </m:sSub>
+                      <m:r>
+                        <a:rPr lang="en-US" sz="3200">
+                          <a:effectLst/>
+                          <a:latin typeface="Cambria Math" panose="02040503050406030204" pitchFamily="18" charset="0"/>
+                          <a:ea typeface="Calibri" panose="020F0502020204030204" pitchFamily="34" charset="0"/>
+                          <a:cs typeface="Times New Roman" panose="02020603050405020304" pitchFamily="18" charset="0"/>
+                        </a:rPr>
+                        <m:t>)</m:t>
+                      </m:r>
+                      <m:r>
+                        <a:rPr lang="en-US" sz="3200" i="1">
+                          <a:effectLst/>
+                          <a:latin typeface="Cambria Math" panose="02040503050406030204" pitchFamily="18" charset="0"/>
+                          <a:ea typeface="Calibri" panose="020F0502020204030204" pitchFamily="34" charset="0"/>
+                          <a:cs typeface="Times New Roman" panose="02020603050405020304" pitchFamily="18" charset="0"/>
+                        </a:rPr>
+                        <m:t>=</m:t>
+                      </m:r>
+                      <m:sSub>
+                        <m:sSubPr>
+                          <m:ctrlPr>
+                            <a:rPr lang="en-US" sz="3200" i="1">
+                              <a:effectLst/>
+                              <a:latin typeface="Cambria Math" panose="02040503050406030204" pitchFamily="18" charset="0"/>
+                              <a:ea typeface="Calibri" panose="020F0502020204030204" pitchFamily="34" charset="0"/>
+                              <a:cs typeface="Times New Roman" panose="02020603050405020304" pitchFamily="18" charset="0"/>
+                            </a:rPr>
+                          </m:ctrlPr>
+                        </m:sSubPr>
+                        <m:e>
+                          <m:r>
+                            <a:rPr lang="en-US" sz="3200" i="1">
+                              <a:effectLst/>
+                              <a:latin typeface="Cambria Math" panose="02040503050406030204" pitchFamily="18" charset="0"/>
+                              <a:ea typeface="Calibri" panose="020F0502020204030204" pitchFamily="34" charset="0"/>
+                              <a:cs typeface="Times New Roman" panose="02020603050405020304" pitchFamily="18" charset="0"/>
+                            </a:rPr>
+                            <m:t>𝑘</m:t>
+                          </m:r>
+                        </m:e>
+                        <m:sub>
+                          <m:r>
+                            <a:rPr lang="en-US" sz="3200" i="1">
+                              <a:effectLst/>
+                              <a:latin typeface="Cambria Math" panose="02040503050406030204" pitchFamily="18" charset="0"/>
+                              <a:ea typeface="Calibri" panose="020F0502020204030204" pitchFamily="34" charset="0"/>
+                              <a:cs typeface="Times New Roman" panose="02020603050405020304" pitchFamily="18" charset="0"/>
+                            </a:rPr>
+                            <m:t>𝑀</m:t>
+                          </m:r>
+                          <m:r>
+                            <a:rPr lang="en-US" sz="3200" i="1">
+                              <a:effectLst/>
+                              <a:latin typeface="Cambria Math" panose="02040503050406030204" pitchFamily="18" charset="0"/>
+                              <a:ea typeface="Calibri" panose="020F0502020204030204" pitchFamily="34" charset="0"/>
+                              <a:cs typeface="Times New Roman" panose="02020603050405020304" pitchFamily="18" charset="0"/>
+                            </a:rPr>
+                            <m:t>0</m:t>
+                          </m:r>
+                        </m:sub>
+                      </m:sSub>
+                      <m:r>
+                        <a:rPr lang="en-US" sz="3200" i="1">
+                          <a:effectLst/>
+                          <a:latin typeface="Cambria Math" panose="02040503050406030204" pitchFamily="18" charset="0"/>
+                          <a:ea typeface="Calibri" panose="020F0502020204030204" pitchFamily="34" charset="0"/>
+                          <a:cs typeface="Times New Roman" panose="02020603050405020304" pitchFamily="18" charset="0"/>
+                        </a:rPr>
+                        <m:t>𝑡</m:t>
+                      </m:r>
+                    </m:oMath>
+                  </m:oMathPara>
+                </a14:m>
+                <a:endParaRPr lang="en-US" sz="3200" dirty="0">
+                  <a:effectLst/>
+                  <a:latin typeface="Calibri" panose="020F0502020204030204" pitchFamily="34" charset="0"/>
+                  <a:ea typeface="Calibri" panose="020F0502020204030204" pitchFamily="34" charset="0"/>
+                  <a:cs typeface="Times New Roman" panose="02020603050405020304" pitchFamily="18" charset="0"/>
+                </a:endParaRPr>
+              </a:p>
+              <a:p>
+                <a:pPr marL="0" marR="0" indent="0">
+                  <a:lnSpc>
+                    <a:spcPct val="160000"/>
+                  </a:lnSpc>
+                  <a:spcBef>
+                    <a:spcPts val="0"/>
+                  </a:spcBef>
+                  <a:spcAft>
+                    <a:spcPts val="800"/>
+                  </a:spcAft>
+                  <a:buNone/>
+                </a:pPr>
+                <a14:m>
+                  <m:oMathPara xmlns:m="http://schemas.openxmlformats.org/officeDocument/2006/math">
+                    <m:oMathParaPr>
+                      <m:jc m:val="centerGroup"/>
+                    </m:oMathParaPr>
+                    <m:oMath xmlns:m="http://schemas.openxmlformats.org/officeDocument/2006/math">
+                      <m:f>
+                        <m:fPr>
+                          <m:ctrlPr>
+                            <a:rPr lang="en-US" sz="3200" i="1">
+                              <a:effectLst/>
+                              <a:latin typeface="Cambria Math" panose="02040503050406030204" pitchFamily="18" charset="0"/>
+                              <a:ea typeface="Calibri" panose="020F0502020204030204" pitchFamily="34" charset="0"/>
+                              <a:cs typeface="Times New Roman" panose="02020603050405020304" pitchFamily="18" charset="0"/>
+                            </a:rPr>
+                          </m:ctrlPr>
+                        </m:fPr>
+                        <m:num>
+                          <m:func>
+                            <m:funcPr>
+                              <m:ctrlPr>
+                                <a:rPr lang="en-US" sz="3200" i="1">
+                                  <a:effectLst/>
+                                  <a:latin typeface="Cambria Math" panose="02040503050406030204" pitchFamily="18" charset="0"/>
+                                  <a:ea typeface="Calibri" panose="020F0502020204030204" pitchFamily="34" charset="0"/>
+                                  <a:cs typeface="Times New Roman" panose="02020603050405020304" pitchFamily="18" charset="0"/>
+                                </a:rPr>
+                              </m:ctrlPr>
+                            </m:funcPr>
+                            <m:fName>
+                              <m:r>
+                                <m:rPr>
+                                  <m:sty m:val="p"/>
+                                </m:rPr>
+                                <a:rPr lang="en-US" sz="3200">
+                                  <a:effectLst/>
+                                  <a:latin typeface="Cambria Math" panose="02040503050406030204" pitchFamily="18" charset="0"/>
+                                  <a:ea typeface="Calibri" panose="020F0502020204030204" pitchFamily="34" charset="0"/>
+                                  <a:cs typeface="Times New Roman" panose="02020603050405020304" pitchFamily="18" charset="0"/>
+                                </a:rPr>
+                                <m:t>ln</m:t>
+                              </m:r>
+                            </m:fName>
+                            <m:e>
+                              <m:d>
+                                <m:dPr>
+                                  <m:ctrlPr>
+                                    <a:rPr lang="en-US" sz="3200" i="1">
+                                      <a:effectLst/>
+                                      <a:latin typeface="Cambria Math" panose="02040503050406030204" pitchFamily="18" charset="0"/>
+                                      <a:ea typeface="Calibri" panose="020F0502020204030204" pitchFamily="34" charset="0"/>
+                                      <a:cs typeface="Times New Roman" panose="02020603050405020304" pitchFamily="18" charset="0"/>
+                                    </a:rPr>
+                                  </m:ctrlPr>
+                                </m:dPr>
+                                <m:e>
+                                  <m:sSub>
+                                    <m:sSubPr>
+                                      <m:ctrlPr>
+                                        <a:rPr lang="en-US" sz="3200" i="1">
+                                          <a:effectLst/>
+                                          <a:latin typeface="Cambria Math" panose="02040503050406030204" pitchFamily="18" charset="0"/>
+                                          <a:ea typeface="Calibri" panose="020F0502020204030204" pitchFamily="34" charset="0"/>
+                                          <a:cs typeface="Times New Roman" panose="02020603050405020304" pitchFamily="18" charset="0"/>
+                                        </a:rPr>
+                                      </m:ctrlPr>
+                                    </m:sSubPr>
+                                    <m:e>
+                                      <m:r>
+                                        <a:rPr lang="en-US" sz="3200" i="1">
+                                          <a:effectLst/>
+                                          <a:latin typeface="Cambria Math" panose="02040503050406030204" pitchFamily="18" charset="0"/>
+                                          <a:ea typeface="Calibri" panose="020F0502020204030204" pitchFamily="34" charset="0"/>
+                                          <a:cs typeface="Times New Roman" panose="02020603050405020304" pitchFamily="18" charset="0"/>
+                                        </a:rPr>
+                                        <m:t>𝑀</m:t>
+                                      </m:r>
+                                    </m:e>
+                                    <m:sub>
+                                      <m:r>
+                                        <a:rPr lang="en-US" sz="3200" i="1">
+                                          <a:effectLst/>
+                                          <a:latin typeface="Cambria Math" panose="02040503050406030204" pitchFamily="18" charset="0"/>
+                                          <a:ea typeface="Calibri" panose="020F0502020204030204" pitchFamily="34" charset="0"/>
+                                          <a:cs typeface="Times New Roman" panose="02020603050405020304" pitchFamily="18" charset="0"/>
+                                        </a:rPr>
+                                        <m:t>𝑉</m:t>
+                                      </m:r>
+                                      <m:r>
+                                        <a:rPr lang="en-US" sz="3200" i="1">
+                                          <a:effectLst/>
+                                          <a:latin typeface="Cambria Math" panose="02040503050406030204" pitchFamily="18" charset="0"/>
+                                          <a:ea typeface="Calibri" panose="020F0502020204030204" pitchFamily="34" charset="0"/>
+                                          <a:cs typeface="Times New Roman" panose="02020603050405020304" pitchFamily="18" charset="0"/>
+                                        </a:rPr>
+                                        <m:t>0</m:t>
+                                      </m:r>
+                                    </m:sub>
+                                  </m:sSub>
+                                </m:e>
+                              </m:d>
+                            </m:e>
+                          </m:func>
+                          <m:r>
+                            <a:rPr lang="en-US" sz="3200" i="1">
+                              <a:effectLst/>
+                              <a:latin typeface="Cambria Math" panose="02040503050406030204" pitchFamily="18" charset="0"/>
+                              <a:ea typeface="Calibri" panose="020F0502020204030204" pitchFamily="34" charset="0"/>
+                              <a:cs typeface="Times New Roman" panose="02020603050405020304" pitchFamily="18" charset="0"/>
+                            </a:rPr>
+                            <m:t>−</m:t>
+                          </m:r>
+                          <m:r>
+                            <m:rPr>
+                              <m:sty m:val="p"/>
+                            </m:rPr>
+                            <a:rPr lang="en-US" sz="3200">
+                              <a:effectLst/>
+                              <a:latin typeface="Cambria Math" panose="02040503050406030204" pitchFamily="18" charset="0"/>
+                              <a:ea typeface="Calibri" panose="020F0502020204030204" pitchFamily="34" charset="0"/>
+                              <a:cs typeface="Times New Roman" panose="02020603050405020304" pitchFamily="18" charset="0"/>
+                            </a:rPr>
+                            <m:t>ln</m:t>
+                          </m:r>
+                          <m:r>
+                            <a:rPr lang="en-US" sz="3200">
+                              <a:effectLst/>
+                              <a:latin typeface="Cambria Math" panose="02040503050406030204" pitchFamily="18" charset="0"/>
+                              <a:ea typeface="Calibri" panose="020F0502020204030204" pitchFamily="34" charset="0"/>
+                              <a:cs typeface="Times New Roman" panose="02020603050405020304" pitchFamily="18" charset="0"/>
+                            </a:rPr>
+                            <m:t>⁡(</m:t>
+                          </m:r>
+                          <m:sSub>
+                            <m:sSubPr>
+                              <m:ctrlPr>
+                                <a:rPr lang="en-US" sz="3200" i="1">
+                                  <a:effectLst/>
+                                  <a:latin typeface="Cambria Math" panose="02040503050406030204" pitchFamily="18" charset="0"/>
+                                  <a:ea typeface="Calibri" panose="020F0502020204030204" pitchFamily="34" charset="0"/>
+                                  <a:cs typeface="Times New Roman" panose="02020603050405020304" pitchFamily="18" charset="0"/>
+                                </a:rPr>
+                              </m:ctrlPr>
+                            </m:sSubPr>
+                            <m:e>
+                              <m:r>
+                                <a:rPr lang="en-US" sz="3200" i="1">
+                                  <a:effectLst/>
+                                  <a:latin typeface="Cambria Math" panose="02040503050406030204" pitchFamily="18" charset="0"/>
+                                  <a:ea typeface="Calibri" panose="020F0502020204030204" pitchFamily="34" charset="0"/>
+                                  <a:cs typeface="Times New Roman" panose="02020603050405020304" pitchFamily="18" charset="0"/>
+                                </a:rPr>
+                                <m:t>𝑀</m:t>
+                              </m:r>
+                            </m:e>
+                            <m:sub>
+                              <m:r>
+                                <a:rPr lang="en-US" sz="3200" i="1">
+                                  <a:effectLst/>
+                                  <a:latin typeface="Cambria Math" panose="02040503050406030204" pitchFamily="18" charset="0"/>
+                                  <a:ea typeface="Calibri" panose="020F0502020204030204" pitchFamily="34" charset="0"/>
+                                  <a:cs typeface="Times New Roman" panose="02020603050405020304" pitchFamily="18" charset="0"/>
+                                </a:rPr>
+                                <m:t>𝑉</m:t>
+                              </m:r>
+                            </m:sub>
+                          </m:sSub>
+                          <m:r>
+                            <a:rPr lang="en-US" sz="3200">
+                              <a:effectLst/>
+                              <a:latin typeface="Cambria Math" panose="02040503050406030204" pitchFamily="18" charset="0"/>
+                              <a:ea typeface="Calibri" panose="020F0502020204030204" pitchFamily="34" charset="0"/>
+                              <a:cs typeface="Times New Roman" panose="02020603050405020304" pitchFamily="18" charset="0"/>
+                            </a:rPr>
+                            <m:t>)</m:t>
+                          </m:r>
+                        </m:num>
+                        <m:den>
+                          <m:r>
+                            <a:rPr lang="en-US" sz="3200" i="1">
+                              <a:effectLst/>
+                              <a:latin typeface="Cambria Math" panose="02040503050406030204" pitchFamily="18" charset="0"/>
+                              <a:ea typeface="Calibri" panose="020F0502020204030204" pitchFamily="34" charset="0"/>
+                              <a:cs typeface="Times New Roman" panose="02020603050405020304" pitchFamily="18" charset="0"/>
+                            </a:rPr>
+                            <m:t>𝑡</m:t>
+                          </m:r>
+                        </m:den>
+                      </m:f>
+                      <m:r>
+                        <a:rPr lang="en-US" sz="3200" i="1">
+                          <a:effectLst/>
+                          <a:latin typeface="Cambria Math" panose="02040503050406030204" pitchFamily="18" charset="0"/>
+                          <a:ea typeface="Calibri" panose="020F0502020204030204" pitchFamily="34" charset="0"/>
+                          <a:cs typeface="Times New Roman" panose="02020603050405020304" pitchFamily="18" charset="0"/>
+                        </a:rPr>
+                        <m:t>=</m:t>
+                      </m:r>
+                      <m:sSub>
+                        <m:sSubPr>
+                          <m:ctrlPr>
+                            <a:rPr lang="en-US" sz="3200" i="1">
+                              <a:effectLst/>
+                              <a:latin typeface="Cambria Math" panose="02040503050406030204" pitchFamily="18" charset="0"/>
+                              <a:ea typeface="Calibri" panose="020F0502020204030204" pitchFamily="34" charset="0"/>
+                              <a:cs typeface="Times New Roman" panose="02020603050405020304" pitchFamily="18" charset="0"/>
+                            </a:rPr>
+                          </m:ctrlPr>
+                        </m:sSubPr>
+                        <m:e>
+                          <m:r>
+                            <a:rPr lang="en-US" sz="3200" i="1">
+                              <a:effectLst/>
+                              <a:latin typeface="Cambria Math" panose="02040503050406030204" pitchFamily="18" charset="0"/>
+                              <a:ea typeface="Calibri" panose="020F0502020204030204" pitchFamily="34" charset="0"/>
+                              <a:cs typeface="Times New Roman" panose="02020603050405020304" pitchFamily="18" charset="0"/>
+                            </a:rPr>
+                            <m:t>𝑘</m:t>
+                          </m:r>
+                        </m:e>
+                        <m:sub>
+                          <m:r>
+                            <a:rPr lang="en-US" sz="3200" i="1">
+                              <a:effectLst/>
+                              <a:latin typeface="Cambria Math" panose="02040503050406030204" pitchFamily="18" charset="0"/>
+                              <a:ea typeface="Calibri" panose="020F0502020204030204" pitchFamily="34" charset="0"/>
+                              <a:cs typeface="Times New Roman" panose="02020603050405020304" pitchFamily="18" charset="0"/>
+                            </a:rPr>
+                            <m:t>𝑀</m:t>
+                          </m:r>
+                          <m:r>
+                            <a:rPr lang="en-US" sz="3200" i="1">
+                              <a:effectLst/>
+                              <a:latin typeface="Cambria Math" panose="02040503050406030204" pitchFamily="18" charset="0"/>
+                              <a:ea typeface="Calibri" panose="020F0502020204030204" pitchFamily="34" charset="0"/>
+                              <a:cs typeface="Times New Roman" panose="02020603050405020304" pitchFamily="18" charset="0"/>
+                            </a:rPr>
+                            <m:t>0</m:t>
+                          </m:r>
+                        </m:sub>
+                      </m:sSub>
+                    </m:oMath>
+                  </m:oMathPara>
+                </a14:m>
+                <a:endParaRPr lang="en-US" sz="3200" dirty="0">
+                  <a:effectLst/>
+                  <a:latin typeface="Calibri" panose="020F0502020204030204" pitchFamily="34" charset="0"/>
+                  <a:ea typeface="Calibri" panose="020F0502020204030204" pitchFamily="34" charset="0"/>
+                  <a:cs typeface="Times New Roman" panose="02020603050405020304" pitchFamily="18" charset="0"/>
+                </a:endParaRPr>
+              </a:p>
+              <a:p>
+                <a:pPr marL="0" indent="0">
+                  <a:buNone/>
+                </a:pPr>
+                <a:endParaRPr lang="en-US" dirty="0"/>
+              </a:p>
+            </p:txBody>
+          </p:sp>
+        </mc:Choice>
+        <mc:Fallback xmlns="">
+          <p:sp>
+            <p:nvSpPr>
+              <p:cNvPr id="3" name="Content Placeholder 2">
+                <a:extLst>
+                  <a:ext uri="{FF2B5EF4-FFF2-40B4-BE49-F238E27FC236}">
+                    <a16:creationId xmlns:a16="http://schemas.microsoft.com/office/drawing/2014/main" id="{3DD3BF68-1537-2790-69C1-090B3C6B1398}"/>
+                  </a:ext>
+                </a:extLst>
+              </p:cNvPr>
+              <p:cNvSpPr>
+                <a:spLocks noGrp="1" noRot="1" noChangeAspect="1" noMove="1" noResize="1" noEditPoints="1" noAdjustHandles="1" noChangeArrowheads="1" noChangeShapeType="1" noTextEdit="1"/>
+              </p:cNvSpPr>
+              <p:nvPr>
+                <p:ph idx="1"/>
+              </p:nvPr>
+            </p:nvSpPr>
+            <p:spPr>
+              <a:xfrm>
+                <a:off x="838200" y="289367"/>
+                <a:ext cx="10515600" cy="6227180"/>
+              </a:xfrm>
+              <a:blipFill>
+                <a:blip r:embed="rId2"/>
+                <a:stretch>
+                  <a:fillRect/>
+                </a:stretch>
+              </a:blipFill>
+            </p:spPr>
+            <p:txBody>
+              <a:bodyPr/>
+              <a:lstStyle/>
+              <a:p>
+                <a:r>
+                  <a:rPr lang="en-US">
+                    <a:noFill/>
+                  </a:rPr>
+                  <a:t> </a:t>
+                </a:r>
+              </a:p>
+            </p:txBody>
+          </p:sp>
+        </mc:Fallback>
+      </mc:AlternateContent>
+    </p:spTree>
+    <p:extLst>
+      <p:ext uri="{BB962C8B-B14F-4D97-AF65-F5344CB8AC3E}">
+        <p14:creationId xmlns:p14="http://schemas.microsoft.com/office/powerpoint/2010/main" val="1339837903"/>
+      </p:ext>
+    </p:extLst>
+  </p:cSld>
+  <p:clrMapOvr>
+    <a:masterClrMapping/>
+  </p:clrMapOvr>
+</p:sld>
+</file>
+
 <file path=ppt/slides/slide2.xml><?xml version="1.0" encoding="utf-8"?>
 <p:sld xmlns:a="http://schemas.openxmlformats.org/drawingml/2006/main" xmlns:r="http://schemas.openxmlformats.org/officeDocument/2006/relationships" xmlns:p="http://schemas.openxmlformats.org/presentationml/2006/main">
   <p:cSld>
@@ -16908,7 +18240,7 @@
           <p:nvPr>
             <p:extLst>
               <p:ext uri="{D42A27DB-BD31-4B8C-83A1-F6EECF244321}">
-                <p14:modId xmlns:p14="http://schemas.microsoft.com/office/powerpoint/2010/main" val="338360562"/>
+                <p14:modId xmlns:p14="http://schemas.microsoft.com/office/powerpoint/2010/main" val="3473174232"/>
               </p:ext>
             </p:extLst>
           </p:nvPr>
@@ -17029,7 +18361,7 @@
                         <a:rPr lang="en-US" sz="1800" dirty="0">
                           <a:effectLst/>
                         </a:rPr>
-                        <a:t>Parameters estimated from ODE</a:t>
+                        <a:t>Parameter estimates</a:t>
                       </a:r>
                       <a:endParaRPr lang="en-US" sz="1800" dirty="0">
                         <a:effectLst/>
@@ -17543,14 +18875,8 @@
                         <a:rPr lang="en-US" sz="1800" dirty="0">
                           <a:effectLst/>
                         </a:rPr>
-                        <a:t>0.1</a:t>
-                      </a:r>
-                      <a:endParaRPr lang="en-US" sz="1800" dirty="0">
-                        <a:effectLst/>
-                        <a:latin typeface="Calibri" panose="020F0502020204030204" pitchFamily="34" charset="0"/>
-                        <a:ea typeface="Calibri" panose="020F0502020204030204" pitchFamily="34" charset="0"/>
-                        <a:cs typeface="Times New Roman" panose="02020603050405020304" pitchFamily="18" charset="0"/>
-                      </a:endParaRPr>
+                        <a:t>0.288 (data)</a:t>
+                      </a:r>
                     </a:p>
                   </a:txBody>
                   <a:tcPr marL="68580" marR="68580" marT="0" marB="0"/>
@@ -25591,8 +26917,8 @@
           </a:p>
         </p:txBody>
       </p:sp>
-      <mc:AlternateContent xmlns:mc="http://schemas.openxmlformats.org/markup-compatibility/2006">
-        <mc:Choice xmlns:a14="http://schemas.microsoft.com/office/drawing/2010/main" Requires="a14">
+      <mc:AlternateContent xmlns:mc="http://schemas.openxmlformats.org/markup-compatibility/2006" xmlns:a14="http://schemas.microsoft.com/office/drawing/2010/main">
+        <mc:Choice Requires="a14">
           <p:sp>
             <p:nvSpPr>
               <p:cNvPr id="3" name="Content Placeholder 2">
@@ -25820,7 +27146,7 @@
             </p:txBody>
           </p:sp>
         </mc:Choice>
-        <mc:Fallback>
+        <mc:Fallback xmlns="">
           <p:sp>
             <p:nvSpPr>
               <p:cNvPr id="3" name="Content Placeholder 2">
@@ -26299,8 +27625,8 @@
           </a:p>
         </p:txBody>
       </p:sp>
-      <mc:AlternateContent xmlns:mc="http://schemas.openxmlformats.org/markup-compatibility/2006">
-        <mc:Choice xmlns:a14="http://schemas.microsoft.com/office/drawing/2010/main" Requires="a14">
+      <mc:AlternateContent xmlns:mc="http://schemas.openxmlformats.org/markup-compatibility/2006" xmlns:a14="http://schemas.microsoft.com/office/drawing/2010/main">
+        <mc:Choice Requires="a14">
           <p:sp>
             <p:nvSpPr>
               <p:cNvPr id="3" name="Content Placeholder 2">
@@ -26777,7 +28103,7 @@
             </p:txBody>
           </p:sp>
         </mc:Choice>
-        <mc:Fallback>
+        <mc:Fallback xmlns="">
           <p:sp>
             <p:nvSpPr>
               <p:cNvPr id="3" name="Content Placeholder 2">

</xml_diff>

<commit_message>
Lots of changes with working on methods and results for Ch 4
</commit_message>
<xml_diff>
--- a/DEBkiss results/Current version and updates.pptx
+++ b/DEBkiss results/Current version and updates.pptx
@@ -4953,7 +4953,7 @@
           <a:p>
             <a:fld id="{4D921083-DB13-42A6-992B-CAABFD17EE1B}" type="datetimeFigureOut">
               <a:rPr lang="en-US" smtClean="0"/>
-              <a:t>2/6/2023</a:t>
+              <a:t>3/20/2023</a:t>
             </a:fld>
             <a:endParaRPr lang="en-US"/>
           </a:p>
@@ -5798,7 +5798,7 @@
           <a:p>
             <a:fld id="{6B92F1DE-9F79-48FD-92D0-4E114789D296}" type="datetimeFigureOut">
               <a:rPr lang="en-US" smtClean="0"/>
-              <a:t>2/6/2023</a:t>
+              <a:t>3/20/2023</a:t>
             </a:fld>
             <a:endParaRPr lang="en-US"/>
           </a:p>
@@ -5996,7 +5996,7 @@
           <a:p>
             <a:fld id="{6B92F1DE-9F79-48FD-92D0-4E114789D296}" type="datetimeFigureOut">
               <a:rPr lang="en-US" smtClean="0"/>
-              <a:t>2/6/2023</a:t>
+              <a:t>3/20/2023</a:t>
             </a:fld>
             <a:endParaRPr lang="en-US"/>
           </a:p>
@@ -6204,7 +6204,7 @@
           <a:p>
             <a:fld id="{6B92F1DE-9F79-48FD-92D0-4E114789D296}" type="datetimeFigureOut">
               <a:rPr lang="en-US" smtClean="0"/>
-              <a:t>2/6/2023</a:t>
+              <a:t>3/20/2023</a:t>
             </a:fld>
             <a:endParaRPr lang="en-US"/>
           </a:p>
@@ -6402,7 +6402,7 @@
           <a:p>
             <a:fld id="{6B92F1DE-9F79-48FD-92D0-4E114789D296}" type="datetimeFigureOut">
               <a:rPr lang="en-US" smtClean="0"/>
-              <a:t>2/6/2023</a:t>
+              <a:t>3/20/2023</a:t>
             </a:fld>
             <a:endParaRPr lang="en-US"/>
           </a:p>
@@ -6677,7 +6677,7 @@
           <a:p>
             <a:fld id="{6B92F1DE-9F79-48FD-92D0-4E114789D296}" type="datetimeFigureOut">
               <a:rPr lang="en-US" smtClean="0"/>
-              <a:t>2/6/2023</a:t>
+              <a:t>3/20/2023</a:t>
             </a:fld>
             <a:endParaRPr lang="en-US"/>
           </a:p>
@@ -6942,7 +6942,7 @@
           <a:p>
             <a:fld id="{6B92F1DE-9F79-48FD-92D0-4E114789D296}" type="datetimeFigureOut">
               <a:rPr lang="en-US" smtClean="0"/>
-              <a:t>2/6/2023</a:t>
+              <a:t>3/20/2023</a:t>
             </a:fld>
             <a:endParaRPr lang="en-US"/>
           </a:p>
@@ -7354,7 +7354,7 @@
           <a:p>
             <a:fld id="{6B92F1DE-9F79-48FD-92D0-4E114789D296}" type="datetimeFigureOut">
               <a:rPr lang="en-US" smtClean="0"/>
-              <a:t>2/6/2023</a:t>
+              <a:t>3/20/2023</a:t>
             </a:fld>
             <a:endParaRPr lang="en-US"/>
           </a:p>
@@ -7495,7 +7495,7 @@
           <a:p>
             <a:fld id="{6B92F1DE-9F79-48FD-92D0-4E114789D296}" type="datetimeFigureOut">
               <a:rPr lang="en-US" smtClean="0"/>
-              <a:t>2/6/2023</a:t>
+              <a:t>3/20/2023</a:t>
             </a:fld>
             <a:endParaRPr lang="en-US"/>
           </a:p>
@@ -7608,7 +7608,7 @@
           <a:p>
             <a:fld id="{6B92F1DE-9F79-48FD-92D0-4E114789D296}" type="datetimeFigureOut">
               <a:rPr lang="en-US" smtClean="0"/>
-              <a:t>2/6/2023</a:t>
+              <a:t>3/20/2023</a:t>
             </a:fld>
             <a:endParaRPr lang="en-US"/>
           </a:p>
@@ -7919,7 +7919,7 @@
           <a:p>
             <a:fld id="{6B92F1DE-9F79-48FD-92D0-4E114789D296}" type="datetimeFigureOut">
               <a:rPr lang="en-US" smtClean="0"/>
-              <a:t>2/6/2023</a:t>
+              <a:t>3/20/2023</a:t>
             </a:fld>
             <a:endParaRPr lang="en-US"/>
           </a:p>
@@ -8207,7 +8207,7 @@
           <a:p>
             <a:fld id="{6B92F1DE-9F79-48FD-92D0-4E114789D296}" type="datetimeFigureOut">
               <a:rPr lang="en-US" smtClean="0"/>
-              <a:t>2/6/2023</a:t>
+              <a:t>3/20/2023</a:t>
             </a:fld>
             <a:endParaRPr lang="en-US"/>
           </a:p>
@@ -8448,7 +8448,7 @@
           <a:p>
             <a:fld id="{6B92F1DE-9F79-48FD-92D0-4E114789D296}" type="datetimeFigureOut">
               <a:rPr lang="en-US" smtClean="0"/>
-              <a:t>2/6/2023</a:t>
+              <a:t>3/20/2023</a:t>
             </a:fld>
             <a:endParaRPr lang="en-US"/>
           </a:p>

</xml_diff>